<commit_message>
Algumas correções do Serjão
</commit_message>
<xml_diff>
--- a/TCC-EUREKA-TIMER.pptx
+++ b/TCC-EUREKA-TIMER.pptx
@@ -206,7 +206,7 @@
           <a:p>
             <a:fld id="{974107CA-16BD-E140-8A20-9D2E91909533}" type="datetimeFigureOut">
               <a:rPr lang="pt-BR" smtClean="0"/>
-              <a:t>06/11/2020</a:t>
+              <a:t>07/11/2020</a:t>
             </a:fld>
             <a:endParaRPr lang="pt-BR"/>
           </a:p>
@@ -473,6 +473,90 @@
 </p:notesMaster>
 </file>
 
+<file path=ppt/notesSlides/notesSlide1.xml><?xml version="1.0" encoding="utf-8"?>
+<p:notes xmlns:a="http://schemas.openxmlformats.org/drawingml/2006/main" xmlns:r="http://schemas.openxmlformats.org/officeDocument/2006/relationships" xmlns:p="http://schemas.openxmlformats.org/presentationml/2006/main">
+  <p:cSld>
+    <p:spTree>
+      <p:nvGrpSpPr>
+        <p:cNvPr id="1" name=""/>
+        <p:cNvGrpSpPr/>
+        <p:nvPr/>
+      </p:nvGrpSpPr>
+      <p:grpSpPr>
+        <a:xfrm>
+          <a:off x="0" y="0"/>
+          <a:ext cx="0" cy="0"/>
+          <a:chOff x="0" y="0"/>
+          <a:chExt cx="0" cy="0"/>
+        </a:xfrm>
+      </p:grpSpPr>
+      <p:sp>
+        <p:nvSpPr>
+          <p:cNvPr id="2" name="Espaço Reservado para Imagem de Slide 1"/>
+          <p:cNvSpPr>
+            <a:spLocks noGrp="1" noRot="1" noChangeAspect="1"/>
+          </p:cNvSpPr>
+          <p:nvPr>
+            <p:ph type="sldImg"/>
+          </p:nvPr>
+        </p:nvSpPr>
+        <p:spPr/>
+      </p:sp>
+      <p:sp>
+        <p:nvSpPr>
+          <p:cNvPr id="3" name="Espaço Reservado para Anotações 2"/>
+          <p:cNvSpPr>
+            <a:spLocks noGrp="1"/>
+          </p:cNvSpPr>
+          <p:nvPr>
+            <p:ph type="body" idx="1"/>
+          </p:nvPr>
+        </p:nvSpPr>
+        <p:spPr/>
+        <p:txBody>
+          <a:bodyPr/>
+          <a:lstStyle/>
+          <a:p>
+            <a:endParaRPr lang="pt-BR" dirty="0"/>
+          </a:p>
+        </p:txBody>
+      </p:sp>
+      <p:sp>
+        <p:nvSpPr>
+          <p:cNvPr id="4" name="Espaço Reservado para Número de Slide 3"/>
+          <p:cNvSpPr>
+            <a:spLocks noGrp="1"/>
+          </p:cNvSpPr>
+          <p:nvPr>
+            <p:ph type="sldNum" sz="quarter" idx="5"/>
+          </p:nvPr>
+        </p:nvSpPr>
+        <p:spPr/>
+        <p:txBody>
+          <a:bodyPr/>
+          <a:lstStyle/>
+          <a:p>
+            <a:fld id="{EE31223B-2860-BA42-A008-D09BA0231AA1}" type="slidenum">
+              <a:rPr lang="pt-BR" smtClean="0"/>
+              <a:t>1</a:t>
+            </a:fld>
+            <a:endParaRPr lang="pt-BR"/>
+          </a:p>
+        </p:txBody>
+      </p:sp>
+    </p:spTree>
+    <p:extLst>
+      <p:ext uri="{BB962C8B-B14F-4D97-AF65-F5344CB8AC3E}">
+        <p14:creationId xmlns:p14="http://schemas.microsoft.com/office/powerpoint/2010/main" val="344451815"/>
+      </p:ext>
+    </p:extLst>
+  </p:cSld>
+  <p:clrMapOvr>
+    <a:masterClrMapping/>
+  </p:clrMapOvr>
+</p:notes>
+</file>
+
 <file path=ppt/slideLayouts/slideLayout1.xml><?xml version="1.0" encoding="utf-8"?>
 <p:sldLayout xmlns:a="http://schemas.openxmlformats.org/drawingml/2006/main" xmlns:r="http://schemas.openxmlformats.org/officeDocument/2006/relationships" xmlns:p="http://schemas.openxmlformats.org/presentationml/2006/main" type="title" preserve="1">
   <p:cSld name="Slide de Título">
@@ -637,7 +721,7 @@
             <a:fld id="{B61BEF0D-F0BB-DE4B-95CE-6DB70DBA9567}" type="datetimeFigureOut">
               <a:rPr lang="en-US" smtClean="0"/>
               <a:pPr/>
-              <a:t>11/6/20</a:t>
+              <a:t>11/7/20</a:t>
             </a:fld>
             <a:endParaRPr lang="en-US" dirty="0"/>
           </a:p>
@@ -808,7 +892,7 @@
           <a:p>
             <a:fld id="{55C6B4A9-1611-4792-9094-5F34BCA07E0B}" type="datetimeFigureOut">
               <a:rPr lang="en-US" smtClean="0"/>
-              <a:t>11/6/20</a:t>
+              <a:t>11/7/20</a:t>
             </a:fld>
             <a:endParaRPr lang="en-US" dirty="0"/>
           </a:p>
@@ -989,7 +1073,7 @@
             <a:fld id="{B61BEF0D-F0BB-DE4B-95CE-6DB70DBA9567}" type="datetimeFigureOut">
               <a:rPr lang="en-US" smtClean="0"/>
               <a:pPr/>
-              <a:t>11/6/20</a:t>
+              <a:t>11/7/20</a:t>
             </a:fld>
             <a:endParaRPr lang="en-US" dirty="0"/>
           </a:p>
@@ -1161,7 +1245,7 @@
             <a:fld id="{B61BEF0D-F0BB-DE4B-95CE-6DB70DBA9567}" type="datetimeFigureOut">
               <a:rPr lang="en-US" smtClean="0"/>
               <a:pPr/>
-              <a:t>11/6/20</a:t>
+              <a:t>11/7/20</a:t>
             </a:fld>
             <a:endParaRPr lang="en-US" dirty="0"/>
           </a:p>
@@ -1431,7 +1515,7 @@
             <a:fld id="{B61BEF0D-F0BB-DE4B-95CE-6DB70DBA9567}" type="datetimeFigureOut">
               <a:rPr lang="en-US" smtClean="0"/>
               <a:pPr/>
-              <a:t>11/6/20</a:t>
+              <a:t>11/7/20</a:t>
             </a:fld>
             <a:endParaRPr lang="en-US" dirty="0"/>
           </a:p>
@@ -1664,7 +1748,7 @@
           <a:p>
             <a:fld id="{EB712588-04B1-427B-82EE-E8DB90309F08}" type="datetimeFigureOut">
               <a:rPr lang="en-US" smtClean="0"/>
-              <a:t>11/6/20</a:t>
+              <a:t>11/7/20</a:t>
             </a:fld>
             <a:endParaRPr lang="en-US" dirty="0"/>
           </a:p>
@@ -2024,7 +2108,7 @@
             <a:fld id="{B61BEF0D-F0BB-DE4B-95CE-6DB70DBA9567}" type="datetimeFigureOut">
               <a:rPr lang="en-US" smtClean="0"/>
               <a:pPr/>
-              <a:t>11/6/20</a:t>
+              <a:t>11/7/20</a:t>
             </a:fld>
             <a:endParaRPr lang="en-US" dirty="0"/>
           </a:p>
@@ -2167,7 +2251,7 @@
             <a:fld id="{B61BEF0D-F0BB-DE4B-95CE-6DB70DBA9567}" type="datetimeFigureOut">
               <a:rPr lang="en-US" smtClean="0"/>
               <a:pPr/>
-              <a:t>11/6/20</a:t>
+              <a:t>11/7/20</a:t>
             </a:fld>
             <a:endParaRPr lang="en-US" dirty="0"/>
           </a:p>
@@ -2264,7 +2348,7 @@
             <a:fld id="{B61BEF0D-F0BB-DE4B-95CE-6DB70DBA9567}" type="datetimeFigureOut">
               <a:rPr lang="en-US" smtClean="0"/>
               <a:pPr/>
-              <a:t>11/6/20</a:t>
+              <a:t>11/7/20</a:t>
             </a:fld>
             <a:endParaRPr lang="en-US" dirty="0"/>
           </a:p>
@@ -2622,7 +2706,7 @@
           <a:p>
             <a:fld id="{42A54C80-263E-416B-A8E0-580EDEADCBDC}" type="datetimeFigureOut">
               <a:rPr lang="en-US" smtClean="0"/>
-              <a:t>11/6/20</a:t>
+              <a:t>11/7/20</a:t>
             </a:fld>
             <a:endParaRPr lang="en-US" dirty="0"/>
           </a:p>
@@ -2980,7 +3064,7 @@
             <a:fld id="{B61BEF0D-F0BB-DE4B-95CE-6DB70DBA9567}" type="datetimeFigureOut">
               <a:rPr lang="en-US" smtClean="0"/>
               <a:pPr/>
-              <a:t>11/6/20</a:t>
+              <a:t>11/7/20</a:t>
             </a:fld>
             <a:endParaRPr lang="en-US" dirty="0"/>
           </a:p>
@@ -3229,7 +3313,7 @@
             <a:fld id="{B61BEF0D-F0BB-DE4B-95CE-6DB70DBA9567}" type="datetimeFigureOut">
               <a:rPr lang="en-US" smtClean="0"/>
               <a:pPr/>
-              <a:t>11/6/20</a:t>
+              <a:t>11/7/20</a:t>
             </a:fld>
             <a:endParaRPr lang="en-US" dirty="0"/>
           </a:p>
@@ -3751,7 +3835,7 @@
                   <a:srgbClr val="FFFFFF"/>
                 </a:solidFill>
               </a:rPr>
-              <a:t>PRÓXIMA LIVE ÀS 10:30</a:t>
+              <a:t>PRÓXIMA LIVE ÀS 16:05</a:t>
             </a:r>
           </a:p>
           <a:p>
@@ -3798,7 +3882,7 @@
             <p:nvPr/>
           </p:nvPicPr>
           <p:blipFill>
-            <a:blip r:embed="rId2"/>
+            <a:blip r:embed="rId3"/>
             <a:stretch>
               <a:fillRect/>
             </a:stretch>
@@ -4122,7 +4206,7 @@
             <p:nvPr/>
           </p:nvPicPr>
           <p:blipFill>
-            <a:blip r:embed="rId3"/>
+            <a:blip r:embed="rId4"/>
             <a:stretch>
               <a:fillRect/>
             </a:stretch>
@@ -4704,7 +4788,7 @@
             <p:nvPr/>
           </p:nvPicPr>
           <p:blipFill>
-            <a:blip r:embed="rId4"/>
+            <a:blip r:embed="rId5"/>
             <a:stretch>
               <a:fillRect/>
             </a:stretch>
@@ -4759,7 +4843,7 @@
           <p:nvPr/>
         </p:nvPicPr>
         <p:blipFill>
-          <a:blip r:embed="rId5"/>
+          <a:blip r:embed="rId6"/>
           <a:stretch>
             <a:fillRect/>
           </a:stretch>

</xml_diff>